<commit_message>
Document proposal for platform, provider, and credential types in community profile (#216)
* In the documentation for community profiles, introduce providers in the section about platforms.

* Separate out documentation for platform types from the rest of the community profiles documentation.

* Minor edits to the discussion about platforms and providers

* Add files via upload

* Add files via upload

* Add files via upload

* Add files via upload

* Add files via upload
</commit_message>
<xml_diff>
--- a/profiles/community/sources/platforms.pptx
+++ b/profiles/community/sources/platforms.pptx
@@ -104,6 +104,11 @@
       </a:defRPr>
     </a:lvl9pPr>
   </p:defaultTextStyle>
+  <p:extLst>
+    <p:ext uri="{EFAFB233-063F-42B5-8137-9DF3F51BA10A}">
+      <p15:sldGuideLst xmlns:p15="http://schemas.microsoft.com/office/powerpoint/2012/main"/>
+    </p:ext>
+  </p:extLst>
 </p:presentation>
 </file>
 
@@ -254,7 +259,7 @@
           <a:p>
             <a:fld id="{5BAF7096-B8B4-4A3B-8A26-165AAEF12400}" type="datetimeFigureOut">
               <a:rPr lang="en-US" smtClean="0"/>
-              <a:t>8/27/2025</a:t>
+              <a:t>9/2/2025</a:t>
             </a:fld>
             <a:endParaRPr lang="en-US"/>
           </a:p>
@@ -452,7 +457,7 @@
           <a:p>
             <a:fld id="{5BAF7096-B8B4-4A3B-8A26-165AAEF12400}" type="datetimeFigureOut">
               <a:rPr lang="en-US" smtClean="0"/>
-              <a:t>8/27/2025</a:t>
+              <a:t>9/2/2025</a:t>
             </a:fld>
             <a:endParaRPr lang="en-US"/>
           </a:p>
@@ -660,7 +665,7 @@
           <a:p>
             <a:fld id="{5BAF7096-B8B4-4A3B-8A26-165AAEF12400}" type="datetimeFigureOut">
               <a:rPr lang="en-US" smtClean="0"/>
-              <a:t>8/27/2025</a:t>
+              <a:t>9/2/2025</a:t>
             </a:fld>
             <a:endParaRPr lang="en-US"/>
           </a:p>
@@ -858,7 +863,7 @@
           <a:p>
             <a:fld id="{5BAF7096-B8B4-4A3B-8A26-165AAEF12400}" type="datetimeFigureOut">
               <a:rPr lang="en-US" smtClean="0"/>
-              <a:t>8/27/2025</a:t>
+              <a:t>9/2/2025</a:t>
             </a:fld>
             <a:endParaRPr lang="en-US"/>
           </a:p>
@@ -1133,7 +1138,7 @@
           <a:p>
             <a:fld id="{5BAF7096-B8B4-4A3B-8A26-165AAEF12400}" type="datetimeFigureOut">
               <a:rPr lang="en-US" smtClean="0"/>
-              <a:t>8/27/2025</a:t>
+              <a:t>9/2/2025</a:t>
             </a:fld>
             <a:endParaRPr lang="en-US"/>
           </a:p>
@@ -1398,7 +1403,7 @@
           <a:p>
             <a:fld id="{5BAF7096-B8B4-4A3B-8A26-165AAEF12400}" type="datetimeFigureOut">
               <a:rPr lang="en-US" smtClean="0"/>
-              <a:t>8/27/2025</a:t>
+              <a:t>9/2/2025</a:t>
             </a:fld>
             <a:endParaRPr lang="en-US"/>
           </a:p>
@@ -1810,7 +1815,7 @@
           <a:p>
             <a:fld id="{5BAF7096-B8B4-4A3B-8A26-165AAEF12400}" type="datetimeFigureOut">
               <a:rPr lang="en-US" smtClean="0"/>
-              <a:t>8/27/2025</a:t>
+              <a:t>9/2/2025</a:t>
             </a:fld>
             <a:endParaRPr lang="en-US"/>
           </a:p>
@@ -1951,7 +1956,7 @@
           <a:p>
             <a:fld id="{5BAF7096-B8B4-4A3B-8A26-165AAEF12400}" type="datetimeFigureOut">
               <a:rPr lang="en-US" smtClean="0"/>
-              <a:t>8/27/2025</a:t>
+              <a:t>9/2/2025</a:t>
             </a:fld>
             <a:endParaRPr lang="en-US"/>
           </a:p>
@@ -2064,7 +2069,7 @@
           <a:p>
             <a:fld id="{5BAF7096-B8B4-4A3B-8A26-165AAEF12400}" type="datetimeFigureOut">
               <a:rPr lang="en-US" smtClean="0"/>
-              <a:t>8/27/2025</a:t>
+              <a:t>9/2/2025</a:t>
             </a:fld>
             <a:endParaRPr lang="en-US"/>
           </a:p>
@@ -2375,7 +2380,7 @@
           <a:p>
             <a:fld id="{5BAF7096-B8B4-4A3B-8A26-165AAEF12400}" type="datetimeFigureOut">
               <a:rPr lang="en-US" smtClean="0"/>
-              <a:t>8/27/2025</a:t>
+              <a:t>9/2/2025</a:t>
             </a:fld>
             <a:endParaRPr lang="en-US"/>
           </a:p>
@@ -2663,7 +2668,7 @@
           <a:p>
             <a:fld id="{5BAF7096-B8B4-4A3B-8A26-165AAEF12400}" type="datetimeFigureOut">
               <a:rPr lang="en-US" smtClean="0"/>
-              <a:t>8/27/2025</a:t>
+              <a:t>9/2/2025</a:t>
             </a:fld>
             <a:endParaRPr lang="en-US"/>
           </a:p>
@@ -2904,7 +2909,7 @@
           <a:p>
             <a:fld id="{5BAF7096-B8B4-4A3B-8A26-165AAEF12400}" type="datetimeFigureOut">
               <a:rPr lang="en-US" smtClean="0"/>
-              <a:t>8/27/2025</a:t>
+              <a:t>9/2/2025</a:t>
             </a:fld>
             <a:endParaRPr lang="en-US"/>
           </a:p>
@@ -3336,7 +3341,7 @@
         <p:spPr>
           <a:xfrm>
             <a:off x="2825496" y="3749040"/>
-            <a:ext cx="786384" cy="274320"/>
+            <a:ext cx="786384" cy="338328"/>
           </a:xfrm>
           <a:prstGeom prst="rect">
             <a:avLst/>
@@ -3378,6 +3383,17 @@
               <a:t>Bare Metal</a:t>
             </a:r>
           </a:p>
+          <a:p>
+            <a:pPr algn="ctr"/>
+            <a:r>
+              <a:rPr lang="en-US" sz="1000" dirty="0">
+                <a:solidFill>
+                  <a:schemeClr val="tx1"/>
+                </a:solidFill>
+              </a:rPr>
+              <a:t>Platform</a:t>
+            </a:r>
+          </a:p>
         </p:txBody>
       </p:sp>
       <p:sp>
@@ -3395,7 +3411,7 @@
         <p:spPr>
           <a:xfrm>
             <a:off x="3611880" y="3566160"/>
-            <a:ext cx="786384" cy="457200"/>
+            <a:ext cx="786384" cy="521208"/>
           </a:xfrm>
           <a:prstGeom prst="rect">
             <a:avLst/>
@@ -3437,6 +3453,17 @@
               <a:t>Compute</a:t>
             </a:r>
           </a:p>
+          <a:p>
+            <a:pPr algn="ctr"/>
+            <a:r>
+              <a:rPr lang="en-US" sz="1000" dirty="0">
+                <a:solidFill>
+                  <a:schemeClr val="tx1"/>
+                </a:solidFill>
+              </a:rPr>
+              <a:t>Platform</a:t>
+            </a:r>
+          </a:p>
         </p:txBody>
       </p:sp>
       <p:sp>
@@ -3454,7 +3481,7 @@
         <p:spPr>
           <a:xfrm>
             <a:off x="4398264" y="3383280"/>
-            <a:ext cx="786384" cy="640080"/>
+            <a:ext cx="786384" cy="704088"/>
           </a:xfrm>
           <a:prstGeom prst="rect">
             <a:avLst/>
@@ -3496,6 +3523,17 @@
               <a:t>IaaS</a:t>
             </a:r>
           </a:p>
+          <a:p>
+            <a:pPr algn="ctr"/>
+            <a:r>
+              <a:rPr lang="en-US" sz="1000" dirty="0">
+                <a:solidFill>
+                  <a:schemeClr val="tx1"/>
+                </a:solidFill>
+              </a:rPr>
+              <a:t>Platform</a:t>
+            </a:r>
+          </a:p>
         </p:txBody>
       </p:sp>
       <p:sp>
@@ -3513,7 +3551,7 @@
         <p:spPr>
           <a:xfrm>
             <a:off x="5184648" y="3200400"/>
-            <a:ext cx="786384" cy="822960"/>
+            <a:ext cx="786384" cy="886968"/>
           </a:xfrm>
           <a:prstGeom prst="rect">
             <a:avLst/>
@@ -3552,7 +3590,18 @@
                   <a:schemeClr val="tx1"/>
                 </a:solidFill>
               </a:rPr>
-              <a:t>K8s</a:t>
+              <a:t>Container</a:t>
+            </a:r>
+          </a:p>
+          <a:p>
+            <a:pPr algn="ctr"/>
+            <a:r>
+              <a:rPr lang="en-US" sz="1000" dirty="0">
+                <a:solidFill>
+                  <a:schemeClr val="tx1"/>
+                </a:solidFill>
+              </a:rPr>
+              <a:t>Platform</a:t>
             </a:r>
           </a:p>
         </p:txBody>
@@ -3572,7 +3621,7 @@
         <p:spPr>
           <a:xfrm>
             <a:off x="5971032" y="3008376"/>
-            <a:ext cx="786384" cy="1014984"/>
+            <a:ext cx="786384" cy="1078992"/>
           </a:xfrm>
           <a:prstGeom prst="rect">
             <a:avLst/>
@@ -3614,6 +3663,17 @@
               <a:t>PaaS</a:t>
             </a:r>
           </a:p>
+          <a:p>
+            <a:pPr algn="ctr"/>
+            <a:r>
+              <a:rPr lang="en-US" sz="1000" dirty="0">
+                <a:solidFill>
+                  <a:schemeClr val="tx1"/>
+                </a:solidFill>
+              </a:rPr>
+              <a:t>Platform</a:t>
+            </a:r>
+          </a:p>
         </p:txBody>
       </p:sp>
       <p:sp>
@@ -3631,7 +3691,7 @@
         <p:spPr>
           <a:xfrm>
             <a:off x="6757416" y="2834640"/>
-            <a:ext cx="786384" cy="1188720"/>
+            <a:ext cx="786384" cy="1252728"/>
           </a:xfrm>
           <a:prstGeom prst="rect">
             <a:avLst/>
@@ -3671,6 +3731,17 @@
                 </a:solidFill>
               </a:rPr>
               <a:t>SaaS</a:t>
+            </a:r>
+          </a:p>
+          <a:p>
+            <a:pPr algn="ctr"/>
+            <a:r>
+              <a:rPr lang="en-US" sz="1000" dirty="0">
+                <a:solidFill>
+                  <a:schemeClr val="tx1"/>
+                </a:solidFill>
+              </a:rPr>
+              <a:t>Platform</a:t>
             </a:r>
           </a:p>
         </p:txBody>

</xml_diff>